<commit_message>
Notes and Chain of Responsibility example
</commit_message>
<xml_diff>
--- a/Notes/Powerpoints/Flyweight.pptx
+++ b/Notes/Powerpoints/Flyweight.pptx
@@ -5,11 +5,12 @@
     <p:sldMasterId id="2147483648" r:id="rId1"/>
   </p:sldMasterIdLst>
   <p:sldIdLst>
-    <p:sldId id="256" r:id="rId2"/>
+    <p:sldId id="269" r:id="rId2"/>
     <p:sldId id="266" r:id="rId3"/>
-    <p:sldId id="267" r:id="rId4"/>
-    <p:sldId id="258" r:id="rId5"/>
-    <p:sldId id="265" r:id="rId6"/>
+    <p:sldId id="256" r:id="rId4"/>
+    <p:sldId id="267" r:id="rId5"/>
+    <p:sldId id="258" r:id="rId6"/>
+    <p:sldId id="265" r:id="rId7"/>
   </p:sldIdLst>
   <p:sldSz cx="12192000" cy="6858000"/>
   <p:notesSz cx="6858000" cy="9144000"/>
@@ -1227,7 +1228,7 @@
             <a:fld id="{B61BEF0D-F0BB-DE4B-95CE-6DB70DBA9567}" type="datetimeFigureOut">
               <a:rPr lang="en-US" dirty="0"/>
               <a:pPr/>
-              <a:t>1/16/2020</a:t>
+              <a:t>1/23/2020</a:t>
             </a:fld>
             <a:endParaRPr lang="en-US" dirty="0"/>
           </a:p>
@@ -1475,7 +1476,7 @@
             <a:fld id="{B61BEF0D-F0BB-DE4B-95CE-6DB70DBA9567}" type="datetimeFigureOut">
               <a:rPr lang="en-US" dirty="0"/>
               <a:pPr/>
-              <a:t>1/16/2020</a:t>
+              <a:t>1/23/2020</a:t>
             </a:fld>
             <a:endParaRPr lang="en-US" dirty="0"/>
           </a:p>
@@ -1786,7 +1787,7 @@
             <a:fld id="{B61BEF0D-F0BB-DE4B-95CE-6DB70DBA9567}" type="datetimeFigureOut">
               <a:rPr lang="en-US" dirty="0"/>
               <a:pPr/>
-              <a:t>1/16/2020</a:t>
+              <a:t>1/23/2020</a:t>
             </a:fld>
             <a:endParaRPr lang="en-US" dirty="0"/>
           </a:p>
@@ -2124,7 +2125,7 @@
             <a:fld id="{B61BEF0D-F0BB-DE4B-95CE-6DB70DBA9567}" type="datetimeFigureOut">
               <a:rPr lang="en-US" dirty="0"/>
               <a:pPr/>
-              <a:t>1/16/2020</a:t>
+              <a:t>1/23/2020</a:t>
             </a:fld>
             <a:endParaRPr lang="en-US" dirty="0"/>
           </a:p>
@@ -2435,7 +2436,7 @@
             <a:fld id="{B61BEF0D-F0BB-DE4B-95CE-6DB70DBA9567}" type="datetimeFigureOut">
               <a:rPr lang="en-US" dirty="0"/>
               <a:pPr/>
-              <a:t>1/16/2020</a:t>
+              <a:t>1/23/2020</a:t>
             </a:fld>
             <a:endParaRPr lang="en-US" dirty="0"/>
           </a:p>
@@ -2825,7 +2826,7 @@
             <a:fld id="{B61BEF0D-F0BB-DE4B-95CE-6DB70DBA9567}" type="datetimeFigureOut">
               <a:rPr lang="en-US" dirty="0"/>
               <a:pPr/>
-              <a:t>1/16/2020</a:t>
+              <a:t>1/23/2020</a:t>
             </a:fld>
             <a:endParaRPr lang="en-US" dirty="0"/>
           </a:p>
@@ -2991,7 +2992,7 @@
           <a:p>
             <a:fld id="{55C6B4A9-1611-4792-9094-5F34BCA07E0B}" type="datetimeFigureOut">
               <a:rPr lang="en-US" dirty="0"/>
-              <a:t>1/16/2020</a:t>
+              <a:t>1/23/2020</a:t>
             </a:fld>
             <a:endParaRPr lang="en-US" dirty="0"/>
           </a:p>
@@ -3167,7 +3168,7 @@
             <a:fld id="{B61BEF0D-F0BB-DE4B-95CE-6DB70DBA9567}" type="datetimeFigureOut">
               <a:rPr lang="en-US" dirty="0"/>
               <a:pPr/>
-              <a:t>1/16/2020</a:t>
+              <a:t>1/23/2020</a:t>
             </a:fld>
             <a:endParaRPr lang="en-US" dirty="0"/>
           </a:p>
@@ -3340,7 +3341,7 @@
             <a:fld id="{B61BEF0D-F0BB-DE4B-95CE-6DB70DBA9567}" type="datetimeFigureOut">
               <a:rPr lang="en-US" dirty="0"/>
               <a:pPr/>
-              <a:t>1/16/2020</a:t>
+              <a:t>1/23/2020</a:t>
             </a:fld>
             <a:endParaRPr lang="en-US" dirty="0"/>
           </a:p>
@@ -3584,7 +3585,7 @@
             <a:fld id="{B61BEF0D-F0BB-DE4B-95CE-6DB70DBA9567}" type="datetimeFigureOut">
               <a:rPr lang="en-US" dirty="0"/>
               <a:pPr/>
-              <a:t>1/16/2020</a:t>
+              <a:t>1/23/2020</a:t>
             </a:fld>
             <a:endParaRPr lang="en-US" dirty="0"/>
           </a:p>
@@ -3812,7 +3813,7 @@
           <a:p>
             <a:fld id="{EB712588-04B1-427B-82EE-E8DB90309F08}" type="datetimeFigureOut">
               <a:rPr lang="en-US" dirty="0"/>
-              <a:t>1/16/2020</a:t>
+              <a:t>1/23/2020</a:t>
             </a:fld>
             <a:endParaRPr lang="en-US" dirty="0"/>
           </a:p>
@@ -4182,7 +4183,7 @@
             <a:fld id="{B61BEF0D-F0BB-DE4B-95CE-6DB70DBA9567}" type="datetimeFigureOut">
               <a:rPr lang="en-US" dirty="0"/>
               <a:pPr/>
-              <a:t>1/16/2020</a:t>
+              <a:t>1/23/2020</a:t>
             </a:fld>
             <a:endParaRPr lang="en-US" dirty="0"/>
           </a:p>
@@ -4302,7 +4303,7 @@
             <a:fld id="{B61BEF0D-F0BB-DE4B-95CE-6DB70DBA9567}" type="datetimeFigureOut">
               <a:rPr lang="en-US" dirty="0"/>
               <a:pPr/>
-              <a:t>1/16/2020</a:t>
+              <a:t>1/23/2020</a:t>
             </a:fld>
             <a:endParaRPr lang="en-US" dirty="0"/>
           </a:p>
@@ -4394,7 +4395,7 @@
             <a:fld id="{B61BEF0D-F0BB-DE4B-95CE-6DB70DBA9567}" type="datetimeFigureOut">
               <a:rPr lang="en-US" dirty="0"/>
               <a:pPr/>
-              <a:t>1/16/2020</a:t>
+              <a:t>1/23/2020</a:t>
             </a:fld>
             <a:endParaRPr lang="en-US" dirty="0"/>
           </a:p>
@@ -4645,7 +4646,7 @@
           <a:p>
             <a:fld id="{42A54C80-263E-416B-A8E0-580EDEADCBDC}" type="datetimeFigureOut">
               <a:rPr lang="en-US" dirty="0"/>
-              <a:t>1/16/2020</a:t>
+              <a:t>1/23/2020</a:t>
             </a:fld>
             <a:endParaRPr lang="en-US" dirty="0"/>
           </a:p>
@@ -4904,7 +4905,7 @@
             <a:fld id="{B61BEF0D-F0BB-DE4B-95CE-6DB70DBA9567}" type="datetimeFigureOut">
               <a:rPr lang="en-US" dirty="0"/>
               <a:pPr/>
-              <a:t>1/16/2020</a:t>
+              <a:t>1/23/2020</a:t>
             </a:fld>
             <a:endParaRPr lang="en-US" dirty="0"/>
           </a:p>
@@ -5644,7 +5645,7 @@
             <a:fld id="{B61BEF0D-F0BB-DE4B-95CE-6DB70DBA9567}" type="datetimeFigureOut">
               <a:rPr lang="en-US" dirty="0"/>
               <a:pPr/>
-              <a:t>1/16/2020</a:t>
+              <a:t>1/23/2020</a:t>
             </a:fld>
             <a:endParaRPr lang="en-US" dirty="0"/>
           </a:p>
@@ -6169,7 +6170,7 @@
           <p:cNvPr id="2" name="Title 1">
             <a:extLst>
               <a:ext uri="{FF2B5EF4-FFF2-40B4-BE49-F238E27FC236}">
-                <a16:creationId xmlns:a16="http://schemas.microsoft.com/office/drawing/2014/main" id="{1F0E3005-E7D0-471D-8EBA-5DADA2960E16}"/>
+                <a16:creationId xmlns:a16="http://schemas.microsoft.com/office/drawing/2014/main" id="{078189A5-1786-4C16-8128-96D957206DD8}"/>
               </a:ext>
             </a:extLst>
           </p:cNvPr>
@@ -6177,56 +6178,30 @@
             <a:spLocks noGrp="1"/>
           </p:cNvSpPr>
           <p:nvPr>
-            <p:ph type="ctrTitle"/>
-          </p:nvPr>
-        </p:nvSpPr>
-        <p:spPr/>
+            <p:ph type="title"/>
+          </p:nvPr>
+        </p:nvSpPr>
+        <p:spPr>
+          <a:xfrm>
+            <a:off x="1086408" y="2606842"/>
+            <a:ext cx="8596668" cy="1320800"/>
+          </a:xfrm>
+        </p:spPr>
         <p:txBody>
           <a:bodyPr/>
           <a:lstStyle/>
           <a:p>
             <a:r>
               <a:rPr lang="en-US" dirty="0"/>
-              <a:t>Design Patterns</a:t>
-            </a:r>
-          </a:p>
-        </p:txBody>
-      </p:sp>
-      <p:sp>
-        <p:nvSpPr>
-          <p:cNvPr id="3" name="Subtitle 2">
-            <a:extLst>
-              <a:ext uri="{FF2B5EF4-FFF2-40B4-BE49-F238E27FC236}">
-                <a16:creationId xmlns:a16="http://schemas.microsoft.com/office/drawing/2014/main" id="{EB069580-9515-4CA1-99E8-D9604888B24F}"/>
-              </a:ext>
-            </a:extLst>
-          </p:cNvPr>
-          <p:cNvSpPr>
-            <a:spLocks noGrp="1"/>
-          </p:cNvSpPr>
-          <p:nvPr>
-            <p:ph type="subTitle" idx="1"/>
-          </p:nvPr>
-        </p:nvSpPr>
-        <p:spPr/>
-        <p:txBody>
-          <a:bodyPr/>
-          <a:lstStyle/>
-          <a:p>
-            <a:r>
-              <a:rPr lang="en-US" dirty="0"/>
-              <a:t>Flyweight</a:t>
-            </a:r>
-          </a:p>
-          <a:p>
-            <a:endParaRPr lang="en-US" dirty="0"/>
+              <a:t>If you could, what would you change about our project?</a:t>
+            </a:r>
           </a:p>
         </p:txBody>
       </p:sp>
     </p:spTree>
     <p:extLst>
       <p:ext uri="{BB962C8B-B14F-4D97-AF65-F5344CB8AC3E}">
-        <p14:creationId xmlns:p14="http://schemas.microsoft.com/office/powerpoint/2010/main" val="3276895302"/>
+        <p14:creationId xmlns:p14="http://schemas.microsoft.com/office/powerpoint/2010/main" val="789651874"/>
       </p:ext>
     </p:extLst>
   </p:cSld>
@@ -6281,7 +6256,7 @@
           <a:p>
             <a:r>
               <a:rPr lang="en-US" dirty="0"/>
-              <a:t>If you could, what would you change about our project?</a:t>
+              <a:t>If anyone is interested in leading a book club session, let me know</a:t>
             </a:r>
           </a:p>
         </p:txBody>
@@ -6321,7 +6296,7 @@
           <p:cNvPr id="2" name="Title 1">
             <a:extLst>
               <a:ext uri="{FF2B5EF4-FFF2-40B4-BE49-F238E27FC236}">
-                <a16:creationId xmlns:a16="http://schemas.microsoft.com/office/drawing/2014/main" id="{F26F3336-1FB8-4E92-8A82-B73E1E2D2C5F}"/>
+                <a16:creationId xmlns:a16="http://schemas.microsoft.com/office/drawing/2014/main" id="{1F0E3005-E7D0-471D-8EBA-5DADA2960E16}"/>
               </a:ext>
             </a:extLst>
           </p:cNvPr>
@@ -6329,7 +6304,7 @@
             <a:spLocks noGrp="1"/>
           </p:cNvSpPr>
           <p:nvPr>
-            <p:ph type="title"/>
+            <p:ph type="ctrTitle"/>
           </p:nvPr>
         </p:nvSpPr>
         <p:spPr/>
@@ -6339,17 +6314,17 @@
           <a:p>
             <a:r>
               <a:rPr lang="en-US" dirty="0"/>
-              <a:t>Motivation	</a:t>
-            </a:r>
-          </a:p>
-        </p:txBody>
-      </p:sp>
-      <p:sp>
-        <p:nvSpPr>
-          <p:cNvPr id="3" name="Content Placeholder 2">
+              <a:t>Design Patterns</a:t>
+            </a:r>
+          </a:p>
+        </p:txBody>
+      </p:sp>
+      <p:sp>
+        <p:nvSpPr>
+          <p:cNvPr id="3" name="Subtitle 2">
             <a:extLst>
               <a:ext uri="{FF2B5EF4-FFF2-40B4-BE49-F238E27FC236}">
-                <a16:creationId xmlns:a16="http://schemas.microsoft.com/office/drawing/2014/main" id="{4BDEB384-408C-4FA2-8E67-1A0255266B37}"/>
+                <a16:creationId xmlns:a16="http://schemas.microsoft.com/office/drawing/2014/main" id="{EB069580-9515-4CA1-99E8-D9604888B24F}"/>
               </a:ext>
             </a:extLst>
           </p:cNvPr>
@@ -6357,7 +6332,7 @@
             <a:spLocks noGrp="1"/>
           </p:cNvSpPr>
           <p:nvPr>
-            <p:ph idx="1"/>
+            <p:ph type="subTitle" idx="1"/>
           </p:nvPr>
         </p:nvSpPr>
         <p:spPr/>
@@ -6367,38 +6342,7 @@
           <a:p>
             <a:r>
               <a:rPr lang="en-US" dirty="0"/>
-              <a:t>Allow the sharing of objects to allow their use of fine granularities without the cost</a:t>
-            </a:r>
-          </a:p>
-          <a:p>
-            <a:pPr lvl="1"/>
-            <a:r>
-              <a:rPr lang="en-US" dirty="0"/>
-              <a:t>Ex: Document editor may encapsulate Columns, Rows, and even Character objects, however with thousands of objects per document, the run time cost could be high</a:t>
-            </a:r>
-          </a:p>
-          <a:p>
-            <a:r>
-              <a:rPr lang="en-US" dirty="0"/>
-              <a:t>States	</a:t>
-            </a:r>
-          </a:p>
-          <a:p>
-            <a:pPr lvl="1"/>
-            <a:r>
-              <a:rPr lang="en-US" dirty="0" err="1"/>
-              <a:t>Intrinsic:state</a:t>
-            </a:r>
-            <a:r>
-              <a:rPr lang="en-US" dirty="0"/>
-              <a:t> stored inside the flyweight, is independent of the context in which its used.</a:t>
-            </a:r>
-          </a:p>
-          <a:p>
-            <a:pPr lvl="1"/>
-            <a:r>
-              <a:rPr lang="en-US" dirty="0"/>
-              <a:t>Extrinsic: Dependent on the context in which the flyweight is used, Client objects mush share extrinsic state with the flyweight</a:t>
+              <a:t>Flyweight</a:t>
             </a:r>
           </a:p>
           <a:p>
@@ -6409,7 +6353,7 @@
     </p:spTree>
     <p:extLst>
       <p:ext uri="{BB962C8B-B14F-4D97-AF65-F5344CB8AC3E}">
-        <p14:creationId xmlns:p14="http://schemas.microsoft.com/office/powerpoint/2010/main" val="2737239039"/>
+        <p14:creationId xmlns:p14="http://schemas.microsoft.com/office/powerpoint/2010/main" val="3276895302"/>
       </p:ext>
     </p:extLst>
   </p:cSld>
@@ -6441,6 +6385,122 @@
           <p:cNvPr id="2" name="Title 1">
             <a:extLst>
               <a:ext uri="{FF2B5EF4-FFF2-40B4-BE49-F238E27FC236}">
+                <a16:creationId xmlns:a16="http://schemas.microsoft.com/office/drawing/2014/main" id="{F26F3336-1FB8-4E92-8A82-B73E1E2D2C5F}"/>
+              </a:ext>
+            </a:extLst>
+          </p:cNvPr>
+          <p:cNvSpPr>
+            <a:spLocks noGrp="1"/>
+          </p:cNvSpPr>
+          <p:nvPr>
+            <p:ph type="title"/>
+          </p:nvPr>
+        </p:nvSpPr>
+        <p:spPr/>
+        <p:txBody>
+          <a:bodyPr/>
+          <a:lstStyle/>
+          <a:p>
+            <a:r>
+              <a:rPr lang="en-US" dirty="0"/>
+              <a:t>Motivation	</a:t>
+            </a:r>
+          </a:p>
+        </p:txBody>
+      </p:sp>
+      <p:sp>
+        <p:nvSpPr>
+          <p:cNvPr id="3" name="Content Placeholder 2">
+            <a:extLst>
+              <a:ext uri="{FF2B5EF4-FFF2-40B4-BE49-F238E27FC236}">
+                <a16:creationId xmlns:a16="http://schemas.microsoft.com/office/drawing/2014/main" id="{4BDEB384-408C-4FA2-8E67-1A0255266B37}"/>
+              </a:ext>
+            </a:extLst>
+          </p:cNvPr>
+          <p:cNvSpPr>
+            <a:spLocks noGrp="1"/>
+          </p:cNvSpPr>
+          <p:nvPr>
+            <p:ph idx="1"/>
+          </p:nvPr>
+        </p:nvSpPr>
+        <p:spPr/>
+        <p:txBody>
+          <a:bodyPr/>
+          <a:lstStyle/>
+          <a:p>
+            <a:r>
+              <a:rPr lang="en-US" dirty="0"/>
+              <a:t>Allow the sharing of objects to allow their use of fine granularities without the cost</a:t>
+            </a:r>
+          </a:p>
+          <a:p>
+            <a:pPr lvl="1"/>
+            <a:r>
+              <a:rPr lang="en-US" dirty="0"/>
+              <a:t>Ex: Document editor may encapsulate Columns, Rows, and even Character objects, however with thousands of objects per document, the run time cost could be high</a:t>
+            </a:r>
+          </a:p>
+          <a:p>
+            <a:r>
+              <a:rPr lang="en-US" dirty="0"/>
+              <a:t>States	</a:t>
+            </a:r>
+          </a:p>
+          <a:p>
+            <a:pPr lvl="1"/>
+            <a:r>
+              <a:rPr lang="en-US" dirty="0"/>
+              <a:t>Intrinsic: state stored inside the flyweight, is independent of the context in which its used.</a:t>
+            </a:r>
+          </a:p>
+          <a:p>
+            <a:pPr lvl="1"/>
+            <a:r>
+              <a:rPr lang="en-US" dirty="0"/>
+              <a:t>Extrinsic: Dependent on the context in which the flyweight is used, Client objects mush share extrinsic state with the flyweight</a:t>
+            </a:r>
+          </a:p>
+          <a:p>
+            <a:endParaRPr lang="en-US" dirty="0"/>
+          </a:p>
+        </p:txBody>
+      </p:sp>
+    </p:spTree>
+    <p:extLst>
+      <p:ext uri="{BB962C8B-B14F-4D97-AF65-F5344CB8AC3E}">
+        <p14:creationId xmlns:p14="http://schemas.microsoft.com/office/powerpoint/2010/main" val="2737239039"/>
+      </p:ext>
+    </p:extLst>
+  </p:cSld>
+  <p:clrMapOvr>
+    <a:masterClrMapping/>
+  </p:clrMapOvr>
+</p:sld>
+</file>
+
+<file path=ppt/slides/slide5.xml><?xml version="1.0" encoding="utf-8"?>
+<p:sld xmlns:a="http://schemas.openxmlformats.org/drawingml/2006/main" xmlns:r="http://schemas.openxmlformats.org/officeDocument/2006/relationships" xmlns:p="http://schemas.openxmlformats.org/presentationml/2006/main">
+  <p:cSld>
+    <p:spTree>
+      <p:nvGrpSpPr>
+        <p:cNvPr id="1" name=""/>
+        <p:cNvGrpSpPr/>
+        <p:nvPr/>
+      </p:nvGrpSpPr>
+      <p:grpSpPr>
+        <a:xfrm>
+          <a:off x="0" y="0"/>
+          <a:ext cx="0" cy="0"/>
+          <a:chOff x="0" y="0"/>
+          <a:chExt cx="0" cy="0"/>
+        </a:xfrm>
+      </p:grpSpPr>
+      <p:sp>
+        <p:nvSpPr>
+          <p:cNvPr id="2" name="Title 1">
+            <a:extLst>
+              <a:ext uri="{FF2B5EF4-FFF2-40B4-BE49-F238E27FC236}">
                 <a16:creationId xmlns:a16="http://schemas.microsoft.com/office/drawing/2014/main" id="{2ECBD130-1D48-4AF3-A3A8-C5133E2A75A3}"/>
               </a:ext>
             </a:extLst>
@@ -6620,7 +6680,7 @@
 </p:sld>
 </file>
 
-<file path=ppt/slides/slide5.xml><?xml version="1.0" encoding="utf-8"?>
+<file path=ppt/slides/slide6.xml><?xml version="1.0" encoding="utf-8"?>
 <p:sld xmlns:a="http://schemas.openxmlformats.org/drawingml/2006/main" xmlns:r="http://schemas.openxmlformats.org/officeDocument/2006/relationships" xmlns:p="http://schemas.openxmlformats.org/presentationml/2006/main">
   <p:cSld>
     <p:spTree>

</xml_diff>